<commit_message>
Update diagrams add classes.txt
</commit_message>
<xml_diff>
--- a/doc/plans/diagrams.pptx
+++ b/doc/plans/diagrams.pptx
@@ -7,13 +7,14 @@
     <p:sldMasterId id="2147483664" r:id="rId3"/>
   </p:sldMasterIdLst>
   <p:notesMasterIdLst>
-    <p:notesMasterId r:id="rId8"/>
+    <p:notesMasterId r:id="rId9"/>
   </p:notesMasterIdLst>
   <p:sldIdLst>
     <p:sldId id="256" r:id="rId4"/>
     <p:sldId id="258" r:id="rId5"/>
     <p:sldId id="259" r:id="rId6"/>
     <p:sldId id="257" r:id="rId7"/>
+    <p:sldId id="260" r:id="rId8"/>
   </p:sldIdLst>
   <p:sldSz cx="9144000" cy="6858000" type="screen4x3"/>
   <p:notesSz cx="6858000" cy="9144000"/>
@@ -7623,7 +7624,7 @@
 </file>
 
 <file path=ppt/slides/slide1.xml><?xml version="1.0" encoding="utf-8"?>
-<p:sld xmlns:a="http://schemas.openxmlformats.org/drawingml/2006/main" xmlns:r="http://schemas.openxmlformats.org/officeDocument/2006/relationships" xmlns:p="http://schemas.openxmlformats.org/presentationml/2006/main">
+<p:sld xmlns:a="http://schemas.openxmlformats.org/drawingml/2006/main" xmlns:r="http://schemas.openxmlformats.org/officeDocument/2006/relationships" xmlns:p="http://schemas.openxmlformats.org/presentationml/2006/main" show="0">
   <p:cSld>
     <p:spTree>
       <p:nvGrpSpPr>
@@ -7822,11 +7823,7 @@
             <a:pPr algn="ctr"/>
             <a:r>
               <a:rPr lang="en-GB" sz="1200" dirty="0" smtClean="0"/>
-              <a:t>(Flask Server </a:t>
-            </a:r>
-            <a:r>
-              <a:rPr lang="en-GB" sz="1200" dirty="0" smtClean="0"/>
-              <a:t>App / REST API)</a:t>
+              <a:t>(Flask Server App / REST API)</a:t>
             </a:r>
             <a:endParaRPr lang="en-GB" sz="1200" dirty="0"/>
           </a:p>
@@ -8153,11 +8150,7 @@
           <a:p>
             <a:r>
               <a:rPr lang="en-GB" sz="1000" dirty="0" smtClean="0"/>
-              <a:t>s</a:t>
-            </a:r>
-            <a:r>
-              <a:rPr lang="en-GB" sz="1000" dirty="0" smtClean="0"/>
-              <a:t>ubmit</a:t>
+              <a:t>submit</a:t>
             </a:r>
             <a:endParaRPr lang="en-GB" sz="1000" dirty="0"/>
           </a:p>
@@ -8441,6 +8434,14 @@
   <p:clrMapOvr>
     <a:masterClrMapping/>
   </p:clrMapOvr>
+  <mc:AlternateContent xmlns:mc="http://schemas.openxmlformats.org/markup-compatibility/2006">
+    <mc:Choice xmlns:p14="http://schemas.microsoft.com/office/powerpoint/2010/main" Requires="p14">
+      <p:transition spd="slow" p14:dur="2000"/>
+    </mc:Choice>
+    <mc:Fallback>
+      <p:transition spd="slow"/>
+    </mc:Fallback>
+  </mc:AlternateContent>
   <p:timing>
     <p:tnLst>
       <p:par>
@@ -8994,7 +8995,7 @@
             <a:solidFill>
               <a:schemeClr val="tx1"/>
             </a:solidFill>
-            <a:tailEnd type="stealth" w="lg" len="lg"/>
+            <a:tailEnd type="stealth" w="med" len="med"/>
           </a:ln>
         </p:spPr>
         <p:style>
@@ -9033,7 +9034,7 @@
             <a:solidFill>
               <a:schemeClr val="tx1"/>
             </a:solidFill>
-            <a:tailEnd type="stealth" w="lg" len="lg"/>
+            <a:tailEnd type="stealth" w="med" len="med"/>
           </a:ln>
         </p:spPr>
         <p:style>
@@ -9087,7 +9088,7 @@
             <a:pPr algn="ctr"/>
             <a:r>
               <a:rPr lang="en-GB" sz="1200" dirty="0" smtClean="0"/>
-              <a:t>Customer</a:t>
+              <a:t>Client</a:t>
             </a:r>
             <a:endParaRPr lang="en-GB" sz="1200" dirty="0" smtClean="0"/>
           </a:p>
@@ -9167,8 +9168,8 @@
             <a:solidFill>
               <a:schemeClr val="tx1"/>
             </a:solidFill>
-            <a:headEnd type="stealth" w="lg" len="lg"/>
-            <a:tailEnd type="stealth" w="lg" len="lg"/>
+            <a:headEnd type="stealth" w="med" len="med"/>
+            <a:tailEnd type="stealth" w="med" len="med"/>
           </a:ln>
         </p:spPr>
         <p:style>
@@ -9207,8 +9208,8 @@
             <a:solidFill>
               <a:schemeClr val="tx1"/>
             </a:solidFill>
-            <a:headEnd type="stealth" w="lg" len="lg"/>
-            <a:tailEnd type="stealth" w="lg" len="lg"/>
+            <a:headEnd type="stealth" w="med" len="med"/>
+            <a:tailEnd type="stealth" w="med" len="med"/>
           </a:ln>
         </p:spPr>
         <p:style>
@@ -9246,7 +9247,7 @@
             <a:solidFill>
               <a:schemeClr val="tx1"/>
             </a:solidFill>
-            <a:tailEnd type="stealth" w="lg" len="lg"/>
+            <a:tailEnd type="stealth" w="med" len="med"/>
           </a:ln>
         </p:spPr>
         <p:style>
@@ -9284,7 +9285,7 @@
             <a:solidFill>
               <a:schemeClr val="tx1"/>
             </a:solidFill>
-            <a:tailEnd type="stealth" w="lg" len="lg"/>
+            <a:tailEnd type="stealth" w="med" len="med"/>
           </a:ln>
         </p:spPr>
         <p:style>
@@ -9369,8 +9370,8 @@
             <a:solidFill>
               <a:schemeClr val="tx1"/>
             </a:solidFill>
-            <a:headEnd type="stealth" w="lg" len="lg"/>
-            <a:tailEnd type="stealth" w="lg" len="lg"/>
+            <a:headEnd type="stealth" w="med" len="med"/>
+            <a:tailEnd type="stealth" w="med" len="med"/>
           </a:ln>
         </p:spPr>
         <p:style>
@@ -9409,8 +9410,8 @@
             <a:solidFill>
               <a:schemeClr val="tx1"/>
             </a:solidFill>
-            <a:headEnd type="stealth" w="lg" len="lg"/>
-            <a:tailEnd type="stealth" w="lg" len="lg"/>
+            <a:headEnd type="stealth" w="med" len="med"/>
+            <a:tailEnd type="stealth" w="med" len="med"/>
           </a:ln>
         </p:spPr>
         <p:style>
@@ -9502,8 +9503,8 @@
             <a:solidFill>
               <a:schemeClr val="tx1"/>
             </a:solidFill>
-            <a:headEnd type="stealth" w="lg" len="lg"/>
-            <a:tailEnd type="stealth" w="lg" len="lg"/>
+            <a:headEnd type="none" w="lg" len="lg"/>
+            <a:tailEnd type="stealth" w="med" len="med"/>
           </a:ln>
         </p:spPr>
         <p:style>
@@ -9542,7 +9543,7 @@
             <a:solidFill>
               <a:schemeClr val="tx1"/>
             </a:solidFill>
-            <a:tailEnd type="stealth" w="lg" len="lg"/>
+            <a:tailEnd type="stealth" w="med" len="med"/>
           </a:ln>
         </p:spPr>
         <p:style>
@@ -9581,7 +9582,7 @@
             <a:solidFill>
               <a:schemeClr val="tx1"/>
             </a:solidFill>
-            <a:tailEnd type="stealth" w="lg" len="lg"/>
+            <a:tailEnd type="stealth" w="med" len="med"/>
           </a:ln>
         </p:spPr>
         <p:style>
@@ -9768,8 +9769,13 @@
             </a:pPr>
             <a:r>
               <a:rPr lang="en-GB" dirty="0" smtClean="0"/>
-              <a:t>Create new entry in database to which the calculation is associated with</a:t>
-            </a:r>
+              <a:t>Create new entry in database to which the calculation is associated </a:t>
+            </a:r>
+            <a:r>
+              <a:rPr lang="en-GB" dirty="0" smtClean="0"/>
+              <a:t>with.</a:t>
+            </a:r>
+            <a:endParaRPr lang="en-GB" dirty="0" smtClean="0"/>
           </a:p>
           <a:p>
             <a:pPr marL="342900" indent="-342900">
@@ -9915,25 +9921,6 @@
       </p:sp>
       <p:sp>
         <p:nvSpPr>
-          <p:cNvPr id="3" name="Content Placeholder 2"/>
-          <p:cNvSpPr>
-            <a:spLocks noGrp="1"/>
-          </p:cNvSpPr>
-          <p:nvPr>
-            <p:ph idx="1"/>
-          </p:nvPr>
-        </p:nvSpPr>
-        <p:spPr/>
-        <p:txBody>
-          <a:bodyPr/>
-          <a:lstStyle/>
-          <a:p>
-            <a:endParaRPr lang="en-GB"/>
-          </a:p>
-        </p:txBody>
-      </p:sp>
-      <p:sp>
-        <p:nvSpPr>
           <p:cNvPr id="4" name="Date Placeholder 3"/>
           <p:cNvSpPr>
             <a:spLocks noGrp="1"/>
@@ -10006,10 +9993,289 @@
           </a:p>
         </p:txBody>
       </p:sp>
+      <p:sp>
+        <p:nvSpPr>
+          <p:cNvPr id="7" name="TextBox 6"/>
+          <p:cNvSpPr txBox="1"/>
+          <p:nvPr/>
+        </p:nvSpPr>
+        <p:spPr>
+          <a:xfrm>
+            <a:off x="381000" y="1524000"/>
+            <a:ext cx="1768433" cy="1077218"/>
+          </a:xfrm>
+          <a:prstGeom prst="rect">
+            <a:avLst/>
+          </a:prstGeom>
+          <a:noFill/>
+          <a:ln w="9525">
+            <a:solidFill>
+              <a:schemeClr val="tx1"/>
+            </a:solidFill>
+          </a:ln>
+        </p:spPr>
+        <p:txBody>
+          <a:bodyPr wrap="none" rtlCol="0" anchor="ctr">
+            <a:spAutoFit/>
+          </a:bodyPr>
+          <a:lstStyle/>
+          <a:p>
+            <a:r>
+              <a:rPr lang="en-GB" sz="800" dirty="0" smtClean="0">
+                <a:latin typeface="Courier New" panose="02070309020205020404" pitchFamily="49" charset="0"/>
+                <a:cs typeface="Courier New" panose="02070309020205020404" pitchFamily="49" charset="0"/>
+              </a:rPr>
+              <a:t>Compound</a:t>
+            </a:r>
+            <a:endParaRPr lang="en-GB" sz="800" dirty="0">
+              <a:latin typeface="Courier New" panose="02070309020205020404" pitchFamily="49" charset="0"/>
+              <a:cs typeface="Courier New" panose="02070309020205020404" pitchFamily="49" charset="0"/>
+            </a:endParaRPr>
+          </a:p>
+          <a:p>
+            <a:r>
+              <a:rPr lang="en-GB" sz="800" dirty="0">
+                <a:latin typeface="Courier New" panose="02070309020205020404" pitchFamily="49" charset="0"/>
+                <a:cs typeface="Courier New" panose="02070309020205020404" pitchFamily="49" charset="0"/>
+              </a:rPr>
+              <a:t>├── </a:t>
+            </a:r>
+            <a:r>
+              <a:rPr lang="en-GB" sz="800" dirty="0" smtClean="0">
+                <a:latin typeface="Courier New" panose="02070309020205020404" pitchFamily="49" charset="0"/>
+                <a:cs typeface="Courier New" panose="02070309020205020404" pitchFamily="49" charset="0"/>
+              </a:rPr>
+              <a:t>charge &lt;INT&gt;</a:t>
+            </a:r>
+            <a:endParaRPr lang="en-GB" sz="800" dirty="0">
+              <a:latin typeface="Courier New" panose="02070309020205020404" pitchFamily="49" charset="0"/>
+              <a:cs typeface="Courier New" panose="02070309020205020404" pitchFamily="49" charset="0"/>
+            </a:endParaRPr>
+          </a:p>
+          <a:p>
+            <a:r>
+              <a:rPr lang="en-GB" sz="800" dirty="0">
+                <a:latin typeface="Courier New" panose="02070309020205020404" pitchFamily="49" charset="0"/>
+                <a:cs typeface="Courier New" panose="02070309020205020404" pitchFamily="49" charset="0"/>
+              </a:rPr>
+              <a:t>├── </a:t>
+            </a:r>
+            <a:r>
+              <a:rPr lang="en-GB" sz="800" dirty="0" smtClean="0">
+                <a:latin typeface="Courier New" panose="02070309020205020404" pitchFamily="49" charset="0"/>
+                <a:cs typeface="Courier New" panose="02070309020205020404" pitchFamily="49" charset="0"/>
+              </a:rPr>
+              <a:t>multiplicity &lt;INT&gt;</a:t>
+            </a:r>
+            <a:endParaRPr lang="en-GB" sz="800" dirty="0">
+              <a:latin typeface="Courier New" panose="02070309020205020404" pitchFamily="49" charset="0"/>
+              <a:cs typeface="Courier New" panose="02070309020205020404" pitchFamily="49" charset="0"/>
+            </a:endParaRPr>
+          </a:p>
+          <a:p>
+            <a:r>
+              <a:rPr lang="en-GB" sz="800" dirty="0">
+                <a:latin typeface="Courier New" panose="02070309020205020404" pitchFamily="49" charset="0"/>
+                <a:cs typeface="Courier New" panose="02070309020205020404" pitchFamily="49" charset="0"/>
+              </a:rPr>
+              <a:t>└── </a:t>
+            </a:r>
+            <a:r>
+              <a:rPr lang="en-GB" sz="800" dirty="0" smtClean="0">
+                <a:latin typeface="Courier New" panose="02070309020205020404" pitchFamily="49" charset="0"/>
+                <a:cs typeface="Courier New" panose="02070309020205020404" pitchFamily="49" charset="0"/>
+              </a:rPr>
+              <a:t>atoms &lt;LIST&gt; of &lt;ATOM&gt;</a:t>
+            </a:r>
+          </a:p>
+          <a:p>
+            <a:r>
+              <a:rPr lang="en-GB" sz="800" dirty="0">
+                <a:latin typeface="Courier New" panose="02070309020205020404" pitchFamily="49" charset="0"/>
+                <a:cs typeface="Courier New" panose="02070309020205020404" pitchFamily="49" charset="0"/>
+              </a:rPr>
+              <a:t>├── charge &lt;INT&gt;</a:t>
+            </a:r>
+          </a:p>
+          <a:p>
+            <a:r>
+              <a:rPr lang="en-GB" sz="800" dirty="0">
+                <a:latin typeface="Courier New" panose="02070309020205020404" pitchFamily="49" charset="0"/>
+                <a:cs typeface="Courier New" panose="02070309020205020404" pitchFamily="49" charset="0"/>
+              </a:rPr>
+              <a:t>├── multiplicity &lt;INT&gt;</a:t>
+            </a:r>
+          </a:p>
+          <a:p>
+            <a:r>
+              <a:rPr lang="en-GB" sz="800" dirty="0">
+                <a:latin typeface="Courier New" panose="02070309020205020404" pitchFamily="49" charset="0"/>
+                <a:cs typeface="Courier New" panose="02070309020205020404" pitchFamily="49" charset="0"/>
+              </a:rPr>
+              <a:t>└── atoms &lt;LIST&gt; of &lt;ATOM&gt;</a:t>
+            </a:r>
+          </a:p>
+          <a:p>
+            <a:endParaRPr lang="en-GB" sz="800" dirty="0">
+              <a:latin typeface="Courier New" panose="02070309020205020404" pitchFamily="49" charset="0"/>
+              <a:cs typeface="Courier New" panose="02070309020205020404" pitchFamily="49" charset="0"/>
+            </a:endParaRPr>
+          </a:p>
+        </p:txBody>
+      </p:sp>
     </p:spTree>
     <p:extLst>
       <p:ext uri="{BB962C8B-B14F-4D97-AF65-F5344CB8AC3E}">
         <p14:creationId xmlns:p14="http://schemas.microsoft.com/office/powerpoint/2010/main" val="3475001306"/>
+      </p:ext>
+    </p:extLst>
+  </p:cSld>
+  <p:clrMapOvr>
+    <a:masterClrMapping/>
+  </p:clrMapOvr>
+  <p:timing>
+    <p:tnLst>
+      <p:par>
+        <p:cTn id="1" dur="indefinite" restart="never" nodeType="tmRoot"/>
+      </p:par>
+    </p:tnLst>
+  </p:timing>
+</p:sld>
+</file>
+
+<file path=ppt/slides/slide5.xml><?xml version="1.0" encoding="utf-8"?>
+<p:sld xmlns:a="http://schemas.openxmlformats.org/drawingml/2006/main" xmlns:r="http://schemas.openxmlformats.org/officeDocument/2006/relationships" xmlns:p="http://schemas.openxmlformats.org/presentationml/2006/main">
+  <p:cSld>
+    <p:spTree>
+      <p:nvGrpSpPr>
+        <p:cNvPr id="1" name=""/>
+        <p:cNvGrpSpPr/>
+        <p:nvPr/>
+      </p:nvGrpSpPr>
+      <p:grpSpPr>
+        <a:xfrm>
+          <a:off x="0" y="0"/>
+          <a:ext cx="0" cy="0"/>
+          <a:chOff x="0" y="0"/>
+          <a:chExt cx="0" cy="0"/>
+        </a:xfrm>
+      </p:grpSpPr>
+      <p:sp>
+        <p:nvSpPr>
+          <p:cNvPr id="2" name="Title 1"/>
+          <p:cNvSpPr>
+            <a:spLocks noGrp="1"/>
+          </p:cNvSpPr>
+          <p:nvPr>
+            <p:ph type="title"/>
+          </p:nvPr>
+        </p:nvSpPr>
+        <p:spPr/>
+        <p:txBody>
+          <a:bodyPr/>
+          <a:lstStyle/>
+          <a:p>
+            <a:endParaRPr lang="en-GB"/>
+          </a:p>
+        </p:txBody>
+      </p:sp>
+      <p:sp>
+        <p:nvSpPr>
+          <p:cNvPr id="3" name="Content Placeholder 2"/>
+          <p:cNvSpPr>
+            <a:spLocks noGrp="1"/>
+          </p:cNvSpPr>
+          <p:nvPr>
+            <p:ph idx="1"/>
+          </p:nvPr>
+        </p:nvSpPr>
+        <p:spPr/>
+        <p:txBody>
+          <a:bodyPr/>
+          <a:lstStyle/>
+          <a:p>
+            <a:endParaRPr lang="en-GB"/>
+          </a:p>
+        </p:txBody>
+      </p:sp>
+      <p:sp>
+        <p:nvSpPr>
+          <p:cNvPr id="4" name="Date Placeholder 3"/>
+          <p:cNvSpPr>
+            <a:spLocks noGrp="1"/>
+          </p:cNvSpPr>
+          <p:nvPr>
+            <p:ph type="dt" sz="half" idx="10"/>
+          </p:nvPr>
+        </p:nvSpPr>
+        <p:spPr/>
+        <p:txBody>
+          <a:bodyPr/>
+          <a:lstStyle/>
+          <a:p>
+            <a:fld id="{5B0596C0-580D-47B0-B151-A1459D494873}" type="datetime1">
+              <a:rPr lang="en-US" smtClean="0"/>
+              <a:t>3/20/2019</a:t>
+            </a:fld>
+            <a:endParaRPr lang="en-US"/>
+          </a:p>
+        </p:txBody>
+      </p:sp>
+      <p:sp>
+        <p:nvSpPr>
+          <p:cNvPr id="5" name="Footer Placeholder 4"/>
+          <p:cNvSpPr>
+            <a:spLocks noGrp="1"/>
+          </p:cNvSpPr>
+          <p:nvPr>
+            <p:ph type="ftr" sz="quarter" idx="11"/>
+          </p:nvPr>
+        </p:nvSpPr>
+        <p:spPr/>
+        <p:txBody>
+          <a:bodyPr/>
+          <a:lstStyle/>
+          <a:p>
+            <a:r>
+              <a:rPr lang="en-US" smtClean="0"/>
+              <a:t>Sebastian Wellig</a:t>
+            </a:r>
+            <a:endParaRPr lang="en-US" dirty="0"/>
+          </a:p>
+        </p:txBody>
+      </p:sp>
+      <p:sp>
+        <p:nvSpPr>
+          <p:cNvPr id="6" name="Slide Number Placeholder 5"/>
+          <p:cNvSpPr>
+            <a:spLocks noGrp="1"/>
+          </p:cNvSpPr>
+          <p:nvPr>
+            <p:ph type="sldNum" sz="quarter" idx="12"/>
+          </p:nvPr>
+        </p:nvSpPr>
+        <p:spPr/>
+        <p:txBody>
+          <a:bodyPr/>
+          <a:lstStyle/>
+          <a:p>
+            <a:r>
+              <a:rPr lang="en-US" smtClean="0"/>
+              <a:t>Page </a:t>
+            </a:r>
+            <a:fld id="{43FE583D-AF35-411E-B0A6-867AE33E885A}" type="slidenum">
+              <a:rPr lang="en-US" smtClean="0"/>
+              <a:pPr/>
+              <a:t>5</a:t>
+            </a:fld>
+            <a:endParaRPr lang="en-US" dirty="0" smtClean="0"/>
+          </a:p>
+        </p:txBody>
+      </p:sp>
+    </p:spTree>
+    <p:extLst>
+      <p:ext uri="{BB962C8B-B14F-4D97-AF65-F5344CB8AC3E}">
+        <p14:creationId xmlns:p14="http://schemas.microsoft.com/office/powerpoint/2010/main" val="1383932957"/>
       </p:ext>
     </p:extLst>
   </p:cSld>

</xml_diff>